<commit_message>
doc for UI & parser
</commit_message>
<xml_diff>
--- a/doc/Architecture.pptx
+++ b/doc/Architecture.pptx
@@ -6,6 +6,8 @@
   </p:sldMasterIdLst>
   <p:sldIdLst>
     <p:sldId id="256" r:id="rId2"/>
+    <p:sldId id="257" r:id="rId3"/>
+    <p:sldId id="258" r:id="rId4"/>
   </p:sldIdLst>
   <p:sldSz cx="5943600" cy="6858000"/>
   <p:notesSz cx="6858000" cy="9144000"/>
@@ -288,7 +290,7 @@
           <a:p>
             <a:fld id="{77F8369C-F31D-4A89-BED0-E840FF6F2FB1}" type="datetimeFigureOut">
               <a:rPr lang="en-US" smtClean="0"/>
-              <a:t>12/3/2010</a:t>
+              <a:t>12/5/2010</a:t>
             </a:fld>
             <a:endParaRPr lang="en-US"/>
           </a:p>
@@ -453,7 +455,7 @@
           <a:p>
             <a:fld id="{77F8369C-F31D-4A89-BED0-E840FF6F2FB1}" type="datetimeFigureOut">
               <a:rPr lang="en-US" smtClean="0"/>
-              <a:t>12/3/2010</a:t>
+              <a:t>12/5/2010</a:t>
             </a:fld>
             <a:endParaRPr lang="en-US"/>
           </a:p>
@@ -628,7 +630,7 @@
           <a:p>
             <a:fld id="{77F8369C-F31D-4A89-BED0-E840FF6F2FB1}" type="datetimeFigureOut">
               <a:rPr lang="en-US" smtClean="0"/>
-              <a:t>12/3/2010</a:t>
+              <a:t>12/5/2010</a:t>
             </a:fld>
             <a:endParaRPr lang="en-US"/>
           </a:p>
@@ -793,7 +795,7 @@
           <a:p>
             <a:fld id="{77F8369C-F31D-4A89-BED0-E840FF6F2FB1}" type="datetimeFigureOut">
               <a:rPr lang="en-US" smtClean="0"/>
-              <a:t>12/3/2010</a:t>
+              <a:t>12/5/2010</a:t>
             </a:fld>
             <a:endParaRPr lang="en-US"/>
           </a:p>
@@ -1034,7 +1036,7 @@
           <a:p>
             <a:fld id="{77F8369C-F31D-4A89-BED0-E840FF6F2FB1}" type="datetimeFigureOut">
               <a:rPr lang="en-US" smtClean="0"/>
-              <a:t>12/3/2010</a:t>
+              <a:t>12/5/2010</a:t>
             </a:fld>
             <a:endParaRPr lang="en-US"/>
           </a:p>
@@ -1317,7 +1319,7 @@
           <a:p>
             <a:fld id="{77F8369C-F31D-4A89-BED0-E840FF6F2FB1}" type="datetimeFigureOut">
               <a:rPr lang="en-US" smtClean="0"/>
-              <a:t>12/3/2010</a:t>
+              <a:t>12/5/2010</a:t>
             </a:fld>
             <a:endParaRPr lang="en-US"/>
           </a:p>
@@ -1734,7 +1736,7 @@
           <a:p>
             <a:fld id="{77F8369C-F31D-4A89-BED0-E840FF6F2FB1}" type="datetimeFigureOut">
               <a:rPr lang="en-US" smtClean="0"/>
-              <a:t>12/3/2010</a:t>
+              <a:t>12/5/2010</a:t>
             </a:fld>
             <a:endParaRPr lang="en-US"/>
           </a:p>
@@ -1847,7 +1849,7 @@
           <a:p>
             <a:fld id="{77F8369C-F31D-4A89-BED0-E840FF6F2FB1}" type="datetimeFigureOut">
               <a:rPr lang="en-US" smtClean="0"/>
-              <a:t>12/3/2010</a:t>
+              <a:t>12/5/2010</a:t>
             </a:fld>
             <a:endParaRPr lang="en-US"/>
           </a:p>
@@ -1937,7 +1939,7 @@
           <a:p>
             <a:fld id="{77F8369C-F31D-4A89-BED0-E840FF6F2FB1}" type="datetimeFigureOut">
               <a:rPr lang="en-US" smtClean="0"/>
-              <a:t>12/3/2010</a:t>
+              <a:t>12/5/2010</a:t>
             </a:fld>
             <a:endParaRPr lang="en-US"/>
           </a:p>
@@ -2209,7 +2211,7 @@
           <a:p>
             <a:fld id="{77F8369C-F31D-4A89-BED0-E840FF6F2FB1}" type="datetimeFigureOut">
               <a:rPr lang="en-US" smtClean="0"/>
-              <a:t>12/3/2010</a:t>
+              <a:t>12/5/2010</a:t>
             </a:fld>
             <a:endParaRPr lang="en-US"/>
           </a:p>
@@ -2457,7 +2459,7 @@
           <a:p>
             <a:fld id="{77F8369C-F31D-4A89-BED0-E840FF6F2FB1}" type="datetimeFigureOut">
               <a:rPr lang="en-US" smtClean="0"/>
-              <a:t>12/3/2010</a:t>
+              <a:t>12/5/2010</a:t>
             </a:fld>
             <a:endParaRPr lang="en-US"/>
           </a:p>
@@ -2665,7 +2667,7 @@
           <a:p>
             <a:fld id="{77F8369C-F31D-4A89-BED0-E840FF6F2FB1}" type="datetimeFigureOut">
               <a:rPr lang="en-US" smtClean="0"/>
-              <a:t>12/3/2010</a:t>
+              <a:t>12/5/2010</a:t>
             </a:fld>
             <a:endParaRPr lang="en-US"/>
           </a:p>
@@ -4268,21 +4270,147 @@
             </a:r>
             <a:r>
               <a:rPr lang="en-US" sz="1400" dirty="0" smtClean="0"/>
-              <a:t>Server (Amazon </a:t>
-            </a:r>
-            <a:r>
-              <a:rPr lang="en-US" sz="1400" dirty="0" smtClean="0"/>
-              <a:t>EC2 </a:t>
-            </a:r>
-            <a:r>
-              <a:rPr lang="en-US" sz="1400" dirty="0" smtClean="0"/>
-              <a:t>Nodes)</a:t>
+              <a:t>Server (Amazon EC2 Nodes)</a:t>
             </a:r>
             <a:endParaRPr lang="en-US" sz="1400" dirty="0"/>
           </a:p>
         </p:txBody>
       </p:sp>
     </p:spTree>
+  </p:cSld>
+  <p:clrMapOvr>
+    <a:masterClrMapping/>
+  </p:clrMapOvr>
+  <p:timing>
+    <p:tnLst>
+      <p:par>
+        <p:cTn id="1" dur="indefinite" restart="never" nodeType="tmRoot"/>
+      </p:par>
+    </p:tnLst>
+  </p:timing>
+</p:sld>
+</file>
+
+<file path=ppt/slides/slide2.xml><?xml version="1.0" encoding="utf-8"?>
+<p:sld xmlns:a="http://schemas.openxmlformats.org/drawingml/2006/main" xmlns:r="http://schemas.openxmlformats.org/officeDocument/2006/relationships" xmlns:p="http://schemas.openxmlformats.org/presentationml/2006/main">
+  <p:cSld>
+    <p:spTree>
+      <p:nvGrpSpPr>
+        <p:cNvPr id="1" name=""/>
+        <p:cNvGrpSpPr/>
+        <p:nvPr/>
+      </p:nvGrpSpPr>
+      <p:grpSpPr>
+        <a:xfrm>
+          <a:off x="0" y="0"/>
+          <a:ext cx="0" cy="0"/>
+          <a:chOff x="0" y="0"/>
+          <a:chExt cx="0" cy="0"/>
+        </a:xfrm>
+      </p:grpSpPr>
+      <p:pic>
+        <p:nvPicPr>
+          <p:cNvPr id="2" name="Picture 1"/>
+          <p:cNvPicPr>
+            <a:picLocks noChangeAspect="1"/>
+          </p:cNvPicPr>
+          <p:nvPr/>
+        </p:nvPicPr>
+        <p:blipFill>
+          <a:blip r:embed="rId2">
+            <a:extLst>
+              <a:ext uri="{28A0092B-C50C-407E-A947-70E740481C1C}">
+                <a14:useLocalDpi xmlns:a14="http://schemas.microsoft.com/office/drawing/2010/main" val="0"/>
+              </a:ext>
+            </a:extLst>
+          </a:blip>
+          <a:stretch>
+            <a:fillRect/>
+          </a:stretch>
+        </p:blipFill>
+        <p:spPr>
+          <a:xfrm>
+            <a:off x="700087" y="38100"/>
+            <a:ext cx="4543425" cy="2247900"/>
+          </a:xfrm>
+          <a:prstGeom prst="rect">
+            <a:avLst/>
+          </a:prstGeom>
+        </p:spPr>
+      </p:pic>
+    </p:spTree>
+    <p:extLst>
+      <p:ext uri="{BB962C8B-B14F-4D97-AF65-F5344CB8AC3E}">
+        <p14:creationId xmlns:p14="http://schemas.microsoft.com/office/powerpoint/2010/main" val="3862611531"/>
+      </p:ext>
+    </p:extLst>
+  </p:cSld>
+  <p:clrMapOvr>
+    <a:masterClrMapping/>
+  </p:clrMapOvr>
+  <p:timing>
+    <p:tnLst>
+      <p:par>
+        <p:cTn id="1" dur="indefinite" restart="never" nodeType="tmRoot"/>
+      </p:par>
+    </p:tnLst>
+  </p:timing>
+</p:sld>
+</file>
+
+<file path=ppt/slides/slide3.xml><?xml version="1.0" encoding="utf-8"?>
+<p:sld xmlns:a="http://schemas.openxmlformats.org/drawingml/2006/main" xmlns:r="http://schemas.openxmlformats.org/officeDocument/2006/relationships" xmlns:p="http://schemas.openxmlformats.org/presentationml/2006/main">
+  <p:cSld>
+    <p:spTree>
+      <p:nvGrpSpPr>
+        <p:cNvPr id="1" name=""/>
+        <p:cNvGrpSpPr/>
+        <p:nvPr/>
+      </p:nvGrpSpPr>
+      <p:grpSpPr>
+        <a:xfrm>
+          <a:off x="0" y="0"/>
+          <a:ext cx="0" cy="0"/>
+          <a:chOff x="0" y="0"/>
+          <a:chExt cx="0" cy="0"/>
+        </a:xfrm>
+      </p:grpSpPr>
+      <p:pic>
+        <p:nvPicPr>
+          <p:cNvPr id="2" name="Picture 1"/>
+          <p:cNvPicPr>
+            <a:picLocks noChangeAspect="1"/>
+          </p:cNvPicPr>
+          <p:nvPr/>
+        </p:nvPicPr>
+        <p:blipFill>
+          <a:blip r:embed="rId2">
+            <a:extLst>
+              <a:ext uri="{28A0092B-C50C-407E-A947-70E740481C1C}">
+                <a14:useLocalDpi xmlns:a14="http://schemas.microsoft.com/office/drawing/2010/main" val="0"/>
+              </a:ext>
+            </a:extLst>
+          </a:blip>
+          <a:stretch>
+            <a:fillRect/>
+          </a:stretch>
+        </p:blipFill>
+        <p:spPr>
+          <a:xfrm>
+            <a:off x="0" y="0"/>
+            <a:ext cx="5943600" cy="5240594"/>
+          </a:xfrm>
+          <a:prstGeom prst="rect">
+            <a:avLst/>
+          </a:prstGeom>
+        </p:spPr>
+      </p:pic>
+    </p:spTree>
+    <p:extLst>
+      <p:ext uri="{BB962C8B-B14F-4D97-AF65-F5344CB8AC3E}">
+        <p14:creationId xmlns:p14="http://schemas.microsoft.com/office/powerpoint/2010/main" val="620561609"/>
+      </p:ext>
+    </p:extLst>
   </p:cSld>
   <p:clrMapOvr>
     <a:masterClrMapping/>

</xml_diff>